<commit_message>
finish the informer review
</commit_message>
<xml_diff>
--- a/0003 Informer the best paper AAAI2021/informer.pptx
+++ b/0003 Informer the best paper AAAI2021/informer.pptx
@@ -8,7 +8,7 @@
     <p:notesMasterId r:id="rId4"/>
   </p:notesMasterIdLst>
   <p:handoutMasterIdLst>
-    <p:handoutMasterId r:id="rId29"/>
+    <p:handoutMasterId r:id="rId30"/>
   </p:handoutMasterIdLst>
   <p:sldIdLst>
     <p:sldId id="359" r:id="rId3"/>
@@ -35,12 +35,13 @@
     <p:sldId id="423" r:id="rId25"/>
     <p:sldId id="424" r:id="rId26"/>
     <p:sldId id="426" r:id="rId27"/>
-    <p:sldId id="406" r:id="rId28"/>
+    <p:sldId id="430" r:id="rId28"/>
+    <p:sldId id="406" r:id="rId29"/>
   </p:sldIdLst>
   <p:sldSz cx="12192000" cy="6858000"/>
   <p:notesSz cx="6858000" cy="9144000"/>
   <p:custDataLst>
-    <p:tags r:id="rId33"/>
+    <p:tags r:id="rId34"/>
   </p:custDataLst>
   <p:defaultTextStyle>
     <a:defPPr>
@@ -1972,6 +1973,84 @@
 </file>
 
 <file path=ppt/notesSlides/notesSlide25.xml><?xml version="1.0" encoding="utf-8"?>
+<p:notes xmlns:a="http://schemas.openxmlformats.org/drawingml/2006/main" xmlns:r="http://schemas.openxmlformats.org/officeDocument/2006/relationships" xmlns:p="http://schemas.openxmlformats.org/presentationml/2006/main">
+  <p:cSld>
+    <p:spTree>
+      <p:nvGrpSpPr>
+        <p:cNvPr id="1" name=""/>
+        <p:cNvGrpSpPr/>
+        <p:nvPr/>
+      </p:nvGrpSpPr>
+      <p:grpSpPr>
+        <a:xfrm>
+          <a:off x="0" y="0"/>
+          <a:ext cx="0" cy="0"/>
+          <a:chOff x="0" y="0"/>
+          <a:chExt cx="0" cy="0"/>
+        </a:xfrm>
+      </p:grpSpPr>
+      <p:sp>
+        <p:nvSpPr>
+          <p:cNvPr id="2" name="幻灯片图像占位符 1"/>
+          <p:cNvSpPr>
+            <a:spLocks noGrp="1" noRot="1" noChangeAspect="1"/>
+          </p:cNvSpPr>
+          <p:nvPr>
+            <p:ph type="sldImg"/>
+          </p:nvPr>
+        </p:nvSpPr>
+        <p:spPr/>
+      </p:sp>
+      <p:sp>
+        <p:nvSpPr>
+          <p:cNvPr id="3" name="备注占位符 2"/>
+          <p:cNvSpPr>
+            <a:spLocks noGrp="1"/>
+          </p:cNvSpPr>
+          <p:nvPr>
+            <p:ph type="body" idx="1"/>
+          </p:nvPr>
+        </p:nvSpPr>
+        <p:spPr/>
+        <p:txBody>
+          <a:bodyPr/>
+          <a:lstStyle/>
+          <a:p>
+            <a:endParaRPr lang="zh-CN" altLang="en-US"/>
+          </a:p>
+        </p:txBody>
+      </p:sp>
+      <p:sp>
+        <p:nvSpPr>
+          <p:cNvPr id="4" name="灯片编号占位符 3"/>
+          <p:cNvSpPr>
+            <a:spLocks noGrp="1"/>
+          </p:cNvSpPr>
+          <p:nvPr>
+            <p:ph type="sldNum" sz="quarter" idx="5"/>
+          </p:nvPr>
+        </p:nvSpPr>
+        <p:spPr/>
+        <p:txBody>
+          <a:bodyPr/>
+          <a:lstStyle/>
+          <a:p>
+            <a:fld id="{8CE537F3-7F9D-4182-8C2D-F2D36A9B177C}" type="slidenum">
+              <a:rPr lang="zh-CN" altLang="en-US" smtClean="0"/>
+            </a:fld>
+            <a:endParaRPr lang="zh-CN" altLang="en-US"/>
+          </a:p>
+        </p:txBody>
+      </p:sp>
+    </p:spTree>
+  </p:cSld>
+  <p:clrMapOvr>
+    <a:masterClrMapping/>
+  </p:clrMapOvr>
+</p:notes>
+</file>
+
+<file path=ppt/notesSlides/notesSlide26.xml><?xml version="1.0" encoding="utf-8"?>
 <p:notes xmlns:a="http://schemas.openxmlformats.org/drawingml/2006/main" xmlns:r="http://schemas.openxmlformats.org/officeDocument/2006/relationships" xmlns:p="http://schemas.openxmlformats.org/presentationml/2006/main">
   <p:cSld>
     <p:spTree>
@@ -3462,7 +3541,7 @@
                 <a:latin typeface="Proxima Nova Rg" panose="02000506030000020004" charset="0"/>
                 <a:cs typeface="Proxima Nova Rg" panose="02000506030000020004" charset="0"/>
               </a:rPr>
-              <a:t>Informer: Beyound Efficient Transformer for Long Sequence Time-Series Forecasting</a:t>
+              <a:t>Informer: Beyond Efficient Transformer for Long Sequence Time-Series Forecasting</a:t>
             </a:r>
             <a:endParaRPr kumimoji="1" lang="en-US" altLang="zh-CN" sz="3200">
               <a:solidFill>
@@ -6138,7 +6217,7 @@
         <p:spPr>
           <a:xfrm>
             <a:off x="2095500" y="1702435"/>
-            <a:ext cx="1736090" cy="521970"/>
+            <a:ext cx="4271645" cy="521970"/>
           </a:xfrm>
           <a:prstGeom prst="rect">
             <a:avLst/>
@@ -6155,7 +6234,7 @@
                 <a:latin typeface="Proxima Nova Rg" panose="02000506030000020004" charset="0"/>
                 <a:cs typeface="Proxima Nova Rg" panose="02000506030000020004" charset="0"/>
               </a:rPr>
-              <a:t>Inference:</a:t>
+              <a:t>Generative Style Decoder:</a:t>
             </a:r>
             <a:endParaRPr lang="en-US" altLang="zh-CN" sz="2800">
               <a:latin typeface="Proxima Nova Rg" panose="02000506030000020004" charset="0"/>
@@ -11791,7 +11870,7 @@
         <p:spPr>
           <a:xfrm>
             <a:off x="344805" y="929005"/>
-            <a:ext cx="5658485" cy="368300"/>
+            <a:ext cx="5419725" cy="368300"/>
           </a:xfrm>
           <a:prstGeom prst="rect">
             <a:avLst/>
@@ -11808,7 +11887,7 @@
                 <a:latin typeface="Proxima Nova Rg" panose="02000506030000020004" charset="0"/>
                 <a:cs typeface="Proxima Nova Rg" panose="02000506030000020004" charset="0"/>
               </a:rPr>
-              <a:t>The precondition of using max-mean instead of ln sum:</a:t>
+              <a:t>The precondition of using max-mean instead of KLD:</a:t>
             </a:r>
             <a:endParaRPr lang="en-US" altLang="zh-CN">
               <a:latin typeface="Proxima Nova Rg" panose="02000506030000020004" charset="0"/>
@@ -12094,6 +12173,207 @@
 </file>
 
 <file path=ppt/slides/slide25.xml><?xml version="1.0" encoding="utf-8"?>
+<p:sld xmlns:a="http://schemas.openxmlformats.org/drawingml/2006/main" xmlns:r="http://schemas.openxmlformats.org/officeDocument/2006/relationships" xmlns:p="http://schemas.openxmlformats.org/presentationml/2006/main">
+  <p:cSld>
+    <p:spTree>
+      <p:nvGrpSpPr>
+        <p:cNvPr id="1" name=""/>
+        <p:cNvGrpSpPr/>
+        <p:nvPr/>
+      </p:nvGrpSpPr>
+      <p:grpSpPr>
+        <a:xfrm>
+          <a:off x="0" y="0"/>
+          <a:ext cx="0" cy="0"/>
+          <a:chOff x="0" y="0"/>
+          <a:chExt cx="0" cy="0"/>
+        </a:xfrm>
+      </p:grpSpPr>
+      <p:cxnSp>
+        <p:nvCxnSpPr>
+          <p:cNvPr id="115" name="直接连接符 114"/>
+          <p:cNvCxnSpPr/>
+          <p:nvPr/>
+        </p:nvCxnSpPr>
+        <p:spPr>
+          <a:xfrm>
+            <a:off x="0" y="635000"/>
+            <a:ext cx="4229100" cy="0"/>
+          </a:xfrm>
+          <a:prstGeom prst="line">
+            <a:avLst/>
+          </a:prstGeom>
+          <a:ln>
+            <a:solidFill>
+              <a:srgbClr val="E3CAB4"/>
+            </a:solidFill>
+            <a:tailEnd type="oval"/>
+          </a:ln>
+        </p:spPr>
+        <p:style>
+          <a:lnRef idx="1">
+            <a:schemeClr val="accent1"/>
+          </a:lnRef>
+          <a:fillRef idx="0">
+            <a:schemeClr val="accent1"/>
+          </a:fillRef>
+          <a:effectRef idx="0">
+            <a:schemeClr val="accent1"/>
+          </a:effectRef>
+          <a:fontRef idx="minor">
+            <a:schemeClr val="tx1"/>
+          </a:fontRef>
+        </p:style>
+      </p:cxnSp>
+      <p:cxnSp>
+        <p:nvCxnSpPr>
+          <p:cNvPr id="116" name="直接连接符 115"/>
+          <p:cNvCxnSpPr/>
+          <p:nvPr/>
+        </p:nvCxnSpPr>
+        <p:spPr>
+          <a:xfrm>
+            <a:off x="7962900" y="635000"/>
+            <a:ext cx="4229100" cy="0"/>
+          </a:xfrm>
+          <a:prstGeom prst="line">
+            <a:avLst/>
+          </a:prstGeom>
+          <a:ln>
+            <a:solidFill>
+              <a:srgbClr val="E3CAB4"/>
+            </a:solidFill>
+            <a:headEnd type="oval"/>
+            <a:tailEnd type="none"/>
+          </a:ln>
+        </p:spPr>
+        <p:style>
+          <a:lnRef idx="1">
+            <a:schemeClr val="accent1"/>
+          </a:lnRef>
+          <a:fillRef idx="0">
+            <a:schemeClr val="accent1"/>
+          </a:fillRef>
+          <a:effectRef idx="0">
+            <a:schemeClr val="accent1"/>
+          </a:effectRef>
+          <a:fontRef idx="minor">
+            <a:schemeClr val="tx1"/>
+          </a:fontRef>
+        </p:style>
+      </p:cxnSp>
+      <p:sp>
+        <p:nvSpPr>
+          <p:cNvPr id="117" name="文本框 116"/>
+          <p:cNvSpPr txBox="1"/>
+          <p:nvPr/>
+        </p:nvSpPr>
+        <p:spPr>
+          <a:xfrm>
+            <a:off x="5315589" y="345292"/>
+            <a:ext cx="1560830" cy="583565"/>
+          </a:xfrm>
+          <a:prstGeom prst="rect">
+            <a:avLst/>
+          </a:prstGeom>
+          <a:noFill/>
+        </p:spPr>
+        <p:txBody>
+          <a:bodyPr wrap="none" rtlCol="0">
+            <a:spAutoFit/>
+            <a:scene3d>
+              <a:camera prst="orthographicFront"/>
+              <a:lightRig rig="threePt" dir="t"/>
+            </a:scene3d>
+            <a:sp3d contourW="12700"/>
+          </a:bodyPr>
+          <a:lstStyle/>
+          <a:p>
+            <a:pPr algn="ctr"/>
+            <a:r>
+              <a:rPr lang="en-US" altLang="zh-CN" sz="3200" dirty="0">
+                <a:latin typeface="Proxima Nova Rg" panose="02000506030000020004" charset="0"/>
+                <a:ea typeface="字魂58号-创中黑" panose="00000500000000000000" pitchFamily="2" charset="-122"/>
+                <a:cs typeface="Proxima Nova Rg" panose="02000506030000020004" charset="0"/>
+                <a:sym typeface="字魂58号-创中黑" panose="00000500000000000000" pitchFamily="2" charset="-122"/>
+              </a:rPr>
+              <a:t>Unclear</a:t>
+            </a:r>
+            <a:endParaRPr lang="en-US" altLang="zh-CN" sz="3200" dirty="0">
+              <a:latin typeface="Proxima Nova Rg" panose="02000506030000020004" charset="0"/>
+              <a:ea typeface="字魂58号-创中黑" panose="00000500000000000000" pitchFamily="2" charset="-122"/>
+              <a:cs typeface="Proxima Nova Rg" panose="02000506030000020004" charset="0"/>
+              <a:sym typeface="字魂58号-创中黑" panose="00000500000000000000" pitchFamily="2" charset="-122"/>
+            </a:endParaRPr>
+          </a:p>
+        </p:txBody>
+      </p:sp>
+      <p:sp>
+        <p:nvSpPr>
+          <p:cNvPr id="4" name="文本框 3"/>
+          <p:cNvSpPr txBox="1"/>
+          <p:nvPr/>
+        </p:nvSpPr>
+        <p:spPr>
+          <a:xfrm>
+            <a:off x="1395095" y="1731010"/>
+            <a:ext cx="9401810" cy="829945"/>
+          </a:xfrm>
+          <a:prstGeom prst="rect">
+            <a:avLst/>
+          </a:prstGeom>
+          <a:noFill/>
+        </p:spPr>
+        <p:txBody>
+          <a:bodyPr wrap="square" rtlCol="0" anchor="t">
+            <a:spAutoFit/>
+          </a:bodyPr>
+          <a:p>
+            <a:r>
+              <a:rPr lang="en-US" altLang="zh-CN" sz="2400">
+                <a:latin typeface="Proxima Nova Rg" panose="02000506030000020004" charset="0"/>
+                <a:cs typeface="Proxima Nova Rg" panose="02000506030000020004" charset="0"/>
+              </a:rPr>
+              <a:t>Need to know the length of the prediction, but one can use spaceholders.</a:t>
+            </a:r>
+            <a:endParaRPr lang="en-US" altLang="zh-CN" sz="2400">
+              <a:solidFill>
+                <a:schemeClr val="tx1"/>
+              </a:solidFill>
+              <a:latin typeface="Proxima Nova Rg" panose="02000506030000020004" charset="0"/>
+              <a:cs typeface="Proxima Nova Rg" panose="02000506030000020004" charset="0"/>
+            </a:endParaRPr>
+          </a:p>
+        </p:txBody>
+      </p:sp>
+    </p:spTree>
+  </p:cSld>
+  <p:clrMapOvr>
+    <a:masterClrMapping/>
+  </p:clrMapOvr>
+  <mc:AlternateContent xmlns:mc="http://schemas.openxmlformats.org/markup-compatibility/2006">
+    <mc:Choice xmlns:p14="http://schemas.microsoft.com/office/powerpoint/2010/main" Requires="p14">
+      <p:transition spd="slow" p14:dur="1500" advTm="3000">
+        <p:split orient="vert"/>
+      </p:transition>
+    </mc:Choice>
+    <mc:Fallback>
+      <p:transition spd="slow" advTm="3000">
+        <p:split orient="vert"/>
+      </p:transition>
+    </mc:Fallback>
+  </mc:AlternateContent>
+  <p:timing>
+    <p:tnLst>
+      <p:par>
+        <p:cTn id="1" dur="indefinite" restart="never" nodeType="tmRoot"/>
+      </p:par>
+    </p:tnLst>
+  </p:timing>
+</p:sld>
+</file>
+
+<file path=ppt/slides/slide26.xml><?xml version="1.0" encoding="utf-8"?>
 <p:sld xmlns:a="http://schemas.openxmlformats.org/drawingml/2006/main" xmlns:r="http://schemas.openxmlformats.org/officeDocument/2006/relationships" xmlns:p="http://schemas.openxmlformats.org/presentationml/2006/main">
   <p:cSld>
     <p:bg>
@@ -14529,7 +14809,7 @@
         <p:spPr>
           <a:xfrm>
             <a:off x="6515735" y="3913505"/>
-            <a:ext cx="3346450" cy="1476375"/>
+            <a:ext cx="2108835" cy="1476375"/>
           </a:xfrm>
           <a:prstGeom prst="rect">
             <a:avLst/>
@@ -14584,7 +14864,7 @@
                 <a:latin typeface="Proxima Nova Rg" panose="02000506030000020004" charset="0"/>
                 <a:cs typeface="Proxima Nova Rg" panose="02000506030000020004" charset="0"/>
               </a:rPr>
-              <a:t>Most information is not needed.</a:t>
+              <a:t>Prune needed.</a:t>
             </a:r>
             <a:endParaRPr lang="en-US" altLang="zh-CN">
               <a:latin typeface="Proxima Nova Rg" panose="02000506030000020004" charset="0"/>

</xml_diff>